<commit_message>
a comment on the simulation condition in phonon.pptx
</commit_message>
<xml_diff>
--- a/phonon.pptx
+++ b/phonon.pptx
@@ -104,7 +104,47 @@
       </a:defRPr>
     </a:lvl9pPr>
   </p:defaultTextStyle>
+  <p:extLst>
+    <p:ext uri="{EFAFB233-063F-42B5-8137-9DF3F51BA10A}">
+      <p15:sldGuideLst xmlns:p15="http://schemas.microsoft.com/office/powerpoint/2012/main"/>
+    </p:ext>
+  </p:extLst>
 </p:presentation>
+</file>
+
+<file path=ppt/commentAuthors.xml><?xml version="1.0" encoding="utf-8"?>
+<p:cmAuthorLst xmlns:a="http://schemas.openxmlformats.org/drawingml/2006/main" xmlns:r="http://schemas.openxmlformats.org/officeDocument/2006/relationships" xmlns:p="http://schemas.openxmlformats.org/presentationml/2006/main">
+  <p:cmAuthor id="1" name="itelu6@gmail.com" initials="" lastIdx="2" clrIdx="0">
+    <p:extLst>
+      <p:ext uri="{19B8F6BF-5375-455C-9EA6-DF929625EA0E}">
+        <p15:presenceInfo xmlns:p15="http://schemas.microsoft.com/office/powerpoint/2012/main" userId="e3538905f87c0dab" providerId="Windows Live"/>
+      </p:ext>
+    </p:extLst>
+  </p:cmAuthor>
+</p:cmAuthorLst>
+</file>
+
+<file path=ppt/comments/comment1.xml><?xml version="1.0" encoding="utf-8"?>
+<p:cmLst xmlns:a="http://schemas.openxmlformats.org/drawingml/2006/main" xmlns:r="http://schemas.openxmlformats.org/officeDocument/2006/relationships" xmlns:p="http://schemas.openxmlformats.org/presentationml/2006/main">
+  <p:cm authorId="1" dt="2023-10-05T15:44:11.441" idx="1">
+    <p:pos x="10" y="10"/>
+    <p:text>what are the simulation conditions for the SCF calculations? for example, number of K points, which functional and pseudopotential? ecut? And so on?   </p:text>
+    <p:extLst>
+      <p:ext uri="{C676402C-5697-4E1C-873F-D02D1690AC5C}">
+        <p15:threadingInfo xmlns:p15="http://schemas.microsoft.com/office/powerpoint/2012/main" timeZoneBias="-120"/>
+      </p:ext>
+    </p:extLst>
+  </p:cm>
+  <p:cm authorId="1" dt="2023-10-05T15:45:29.070" idx="2">
+    <p:pos x="146" y="146"/>
+    <p:text/>
+    <p:extLst>
+      <p:ext uri="{C676402C-5697-4E1C-873F-D02D1690AC5C}">
+        <p15:threadingInfo xmlns:p15="http://schemas.microsoft.com/office/powerpoint/2012/main" timeZoneBias="-120"/>
+      </p:ext>
+    </p:extLst>
+  </p:cm>
+</p:cmLst>
 </file>
 
 <file path=ppt/slideLayouts/slideLayout1.xml><?xml version="1.0" encoding="utf-8"?>

</xml_diff>

<commit_message>
add scf calculation information
</commit_message>
<xml_diff>
--- a/phonon.pptx
+++ b/phonon.pptx
@@ -128,8 +128,8 @@
 <p:cmLst xmlns:a="http://schemas.openxmlformats.org/drawingml/2006/main" xmlns:r="http://schemas.openxmlformats.org/officeDocument/2006/relationships" xmlns:p="http://schemas.openxmlformats.org/presentationml/2006/main">
   <p:cm authorId="1" dt="2023-10-05T15:44:11.441" idx="1">
     <p:pos x="10" y="10"/>
-    <p:text>what are the simulation conditions for the SCF calculations? for example, number of K points, which functional and pseudopotential? ecut? And so on?   </p:text>
-    <p:extLst>
+    <p:text>what are the simulation conditions for the SCF calculations? for example, number of K points, which functional and pseudopotential? ecut? And so on?</p:text>
+    <p:extLst mod="1">
       <p:ext uri="{C676402C-5697-4E1C-873F-D02D1690AC5C}">
         <p15:threadingInfo xmlns:p15="http://schemas.microsoft.com/office/powerpoint/2012/main" timeZoneBias="-120"/>
       </p:ext>
@@ -3488,6 +3488,96 @@
           </a:p>
         </p:txBody>
       </p:sp>
+      <p:sp>
+        <p:nvSpPr>
+          <p:cNvPr id="2" name="文本框 1">
+            <a:extLst>
+              <a:ext uri="{FF2B5EF4-FFF2-40B4-BE49-F238E27FC236}">
+                <a16:creationId xmlns:a16="http://schemas.microsoft.com/office/drawing/2014/main" id="{2DEF031C-DF3E-4A82-8530-164536C504B3}"/>
+              </a:ext>
+            </a:extLst>
+          </p:cNvPr>
+          <p:cNvSpPr txBox="1"/>
+          <p:nvPr/>
+        </p:nvSpPr>
+        <p:spPr>
+          <a:xfrm>
+            <a:off x="7335081" y="3091994"/>
+            <a:ext cx="3268844" cy="2031325"/>
+          </a:xfrm>
+          <a:prstGeom prst="rect">
+            <a:avLst/>
+          </a:prstGeom>
+          <a:noFill/>
+        </p:spPr>
+        <p:txBody>
+          <a:bodyPr wrap="none" rtlCol="0">
+            <a:spAutoFit/>
+          </a:bodyPr>
+          <a:lstStyle/>
+          <a:p>
+            <a:r>
+              <a:rPr lang="en-US" altLang="zh-CN" dirty="0"/>
+              <a:t>SCF calculation</a:t>
+            </a:r>
+            <a:r>
+              <a:rPr lang="zh-CN" altLang="en-US" dirty="0"/>
+              <a:t>：</a:t>
+            </a:r>
+            <a:endParaRPr lang="en-US" altLang="zh-CN" dirty="0"/>
+          </a:p>
+          <a:p>
+            <a:r>
+              <a:rPr lang="en-US" altLang="zh-CN" dirty="0"/>
+              <a:t>k-points 16x16x12</a:t>
+            </a:r>
+          </a:p>
+          <a:p>
+            <a:r>
+              <a:rPr lang="en-US" altLang="zh-CN" dirty="0" err="1"/>
+              <a:t>ecutwfc</a:t>
+            </a:r>
+            <a:r>
+              <a:rPr lang="en-US" altLang="zh-CN" dirty="0"/>
+              <a:t>=35</a:t>
+            </a:r>
+          </a:p>
+          <a:p>
+            <a:r>
+              <a:rPr lang="en-US" altLang="zh-CN" dirty="0"/>
+              <a:t>smearing=</a:t>
+            </a:r>
+            <a:r>
+              <a:rPr lang="en-US" altLang="zh-CN" dirty="0" err="1"/>
+              <a:t>methfessel-paxton</a:t>
+            </a:r>
+            <a:endParaRPr lang="en-US" altLang="zh-CN" dirty="0"/>
+          </a:p>
+          <a:p>
+            <a:r>
+              <a:rPr lang="en-US" altLang="zh-CN" dirty="0"/>
+              <a:t>degauss=0.025</a:t>
+            </a:r>
+          </a:p>
+          <a:p>
+            <a:r>
+              <a:rPr lang="en-US" altLang="zh-CN" dirty="0"/>
+              <a:t>functional PBE</a:t>
+            </a:r>
+          </a:p>
+          <a:p>
+            <a:r>
+              <a:rPr lang="en-US" altLang="zh-CN" dirty="0"/>
+              <a:t>Pseudopotential </a:t>
+            </a:r>
+            <a:r>
+              <a:rPr lang="en-US" altLang="zh-CN"/>
+              <a:t>from tutorials</a:t>
+            </a:r>
+            <a:endParaRPr lang="en-US" altLang="zh-CN" dirty="0"/>
+          </a:p>
+        </p:txBody>
+      </p:sp>
     </p:spTree>
     <p:extLst>
       <p:ext uri="{BB962C8B-B14F-4D97-AF65-F5344CB8AC3E}">

</xml_diff>